<commit_message>
multiple changes to network and crypto
</commit_message>
<xml_diff>
--- a/5.Crypto/Cryptology5-Public-Key-RSA-Math.pptx
+++ b/5.Crypto/Cryptology5-Public-Key-RSA-Math.pptx
@@ -211,7 +211,7 @@
           <a:p>
             <a:fld id="{289BAD8F-4DB2-4D2A-B008-EF14D15C42D2}" type="datetimeFigureOut">
               <a:rPr lang="en-US" smtClean="0"/>
-              <a:t>2/20/2020</a:t>
+              <a:t>10/2/2020</a:t>
             </a:fld>
             <a:endParaRPr lang="en-US"/>
           </a:p>
@@ -2767,7 +2767,7 @@
           <a:p>
             <a:fld id="{967C471C-5AC8-4A7E-A353-B9ADC61BE9F7}" type="datetimeFigureOut">
               <a:rPr lang="en-US" smtClean="0"/>
-              <a:t>2/20/2020</a:t>
+              <a:t>10/2/2020</a:t>
             </a:fld>
             <a:endParaRPr lang="en-US"/>
           </a:p>
@@ -2965,7 +2965,7 @@
           <a:p>
             <a:fld id="{967C471C-5AC8-4A7E-A353-B9ADC61BE9F7}" type="datetimeFigureOut">
               <a:rPr lang="en-US" smtClean="0"/>
-              <a:t>2/20/2020</a:t>
+              <a:t>10/2/2020</a:t>
             </a:fld>
             <a:endParaRPr lang="en-US"/>
           </a:p>
@@ -3173,7 +3173,7 @@
           <a:p>
             <a:fld id="{967C471C-5AC8-4A7E-A353-B9ADC61BE9F7}" type="datetimeFigureOut">
               <a:rPr lang="en-US" smtClean="0"/>
-              <a:t>2/20/2020</a:t>
+              <a:t>10/2/2020</a:t>
             </a:fld>
             <a:endParaRPr lang="en-US"/>
           </a:p>
@@ -3371,7 +3371,7 @@
           <a:p>
             <a:fld id="{967C471C-5AC8-4A7E-A353-B9ADC61BE9F7}" type="datetimeFigureOut">
               <a:rPr lang="en-US" smtClean="0"/>
-              <a:t>2/20/2020</a:t>
+              <a:t>10/2/2020</a:t>
             </a:fld>
             <a:endParaRPr lang="en-US"/>
           </a:p>
@@ -3646,7 +3646,7 @@
           <a:p>
             <a:fld id="{967C471C-5AC8-4A7E-A353-B9ADC61BE9F7}" type="datetimeFigureOut">
               <a:rPr lang="en-US" smtClean="0"/>
-              <a:t>2/20/2020</a:t>
+              <a:t>10/2/2020</a:t>
             </a:fld>
             <a:endParaRPr lang="en-US"/>
           </a:p>
@@ -3911,7 +3911,7 @@
           <a:p>
             <a:fld id="{967C471C-5AC8-4A7E-A353-B9ADC61BE9F7}" type="datetimeFigureOut">
               <a:rPr lang="en-US" smtClean="0"/>
-              <a:t>2/20/2020</a:t>
+              <a:t>10/2/2020</a:t>
             </a:fld>
             <a:endParaRPr lang="en-US"/>
           </a:p>
@@ -4323,7 +4323,7 @@
           <a:p>
             <a:fld id="{967C471C-5AC8-4A7E-A353-B9ADC61BE9F7}" type="datetimeFigureOut">
               <a:rPr lang="en-US" smtClean="0"/>
-              <a:t>2/20/2020</a:t>
+              <a:t>10/2/2020</a:t>
             </a:fld>
             <a:endParaRPr lang="en-US"/>
           </a:p>
@@ -4464,7 +4464,7 @@
           <a:p>
             <a:fld id="{967C471C-5AC8-4A7E-A353-B9ADC61BE9F7}" type="datetimeFigureOut">
               <a:rPr lang="en-US" smtClean="0"/>
-              <a:t>2/20/2020</a:t>
+              <a:t>10/2/2020</a:t>
             </a:fld>
             <a:endParaRPr lang="en-US"/>
           </a:p>
@@ -4577,7 +4577,7 @@
           <a:p>
             <a:fld id="{967C471C-5AC8-4A7E-A353-B9ADC61BE9F7}" type="datetimeFigureOut">
               <a:rPr lang="en-US" smtClean="0"/>
-              <a:t>2/20/2020</a:t>
+              <a:t>10/2/2020</a:t>
             </a:fld>
             <a:endParaRPr lang="en-US"/>
           </a:p>
@@ -4888,7 +4888,7 @@
           <a:p>
             <a:fld id="{967C471C-5AC8-4A7E-A353-B9ADC61BE9F7}" type="datetimeFigureOut">
               <a:rPr lang="en-US" smtClean="0"/>
-              <a:t>2/20/2020</a:t>
+              <a:t>10/2/2020</a:t>
             </a:fld>
             <a:endParaRPr lang="en-US"/>
           </a:p>
@@ -5176,7 +5176,7 @@
           <a:p>
             <a:fld id="{967C471C-5AC8-4A7E-A353-B9ADC61BE9F7}" type="datetimeFigureOut">
               <a:rPr lang="en-US" smtClean="0"/>
-              <a:t>2/20/2020</a:t>
+              <a:t>10/2/2020</a:t>
             </a:fld>
             <a:endParaRPr lang="en-US"/>
           </a:p>
@@ -5417,7 +5417,7 @@
           <a:p>
             <a:fld id="{967C471C-5AC8-4A7E-A353-B9ADC61BE9F7}" type="datetimeFigureOut">
               <a:rPr lang="en-US" smtClean="0"/>
-              <a:t>2/20/2020</a:t>
+              <a:t>10/2/2020</a:t>
             </a:fld>
             <a:endParaRPr lang="en-US"/>
           </a:p>
@@ -6888,14 +6888,14 @@
             <a:pPr lvl="1"/>
             <a:r>
               <a:rPr lang="en-US" dirty="0"/>
-              <a:t>For 1024 bit number, probability ≈ 1/355</a:t>
+              <a:t>For 1024-bit number, probability ≈ 1/355</a:t>
             </a:r>
           </a:p>
           <a:p>
             <a:pPr lvl="1"/>
             <a:r>
               <a:rPr lang="en-US" dirty="0"/>
-              <a:t>For 2048 bit number, probability ≈ 1/710</a:t>
+              <a:t>For 2048-bit number, probability ≈ 1/710</a:t>
             </a:r>
           </a:p>
           <a:p>
@@ -6994,14 +6994,14 @@
             <a:pPr lvl="1"/>
             <a:r>
               <a:rPr lang="en-US" dirty="0"/>
-              <a:t>355 random numbers for 1024 bit number</a:t>
+              <a:t>355 random numbers for 1024-bit number</a:t>
             </a:r>
           </a:p>
           <a:p>
             <a:pPr lvl="1"/>
             <a:r>
               <a:rPr lang="en-US" dirty="0"/>
-              <a:t>1024 bit p and q yields 2048 bit n</a:t>
+              <a:t>1024-bit p and q yields 2048-bit n</a:t>
             </a:r>
           </a:p>
           <a:p>
@@ -7109,7 +7109,7 @@
           <a:p>
             <a:r>
               <a:rPr lang="en-US" dirty="0"/>
-              <a:t>But, RSA is more complicated in practice</a:t>
+              <a:t>But RSA is more complicated in practice</a:t>
             </a:r>
           </a:p>
         </p:txBody>

</xml_diff>